<commit_message>
Is it only Tuesday?
</commit_message>
<xml_diff>
--- a/6023_Gems/D2D/W06_LOD_1/6023_W06_LOD_part_1.pptx
+++ b/6023_Gems/D2D/W06_LOD_1/6023_W06_LOD_part_1.pptx
@@ -5,11 +5,15 @@
     <p:sldMasterId id="2147483756" r:id="rId1"/>
   </p:sldMasterIdLst>
   <p:notesMasterIdLst>
-    <p:notesMasterId r:id="rId4"/>
+    <p:notesMasterId r:id="rId8"/>
   </p:notesMasterIdLst>
   <p:sldIdLst>
     <p:sldId id="256" r:id="rId2"/>
-    <p:sldId id="257" r:id="rId3"/>
+    <p:sldId id="258" r:id="rId3"/>
+    <p:sldId id="260" r:id="rId4"/>
+    <p:sldId id="259" r:id="rId5"/>
+    <p:sldId id="257" r:id="rId6"/>
+    <p:sldId id="261" r:id="rId7"/>
   </p:sldIdLst>
   <p:sldSz cx="9144000" cy="5143500" type="screen16x9"/>
   <p:notesSz cx="6858000" cy="9144000"/>
@@ -224,7 +228,7 @@
             <a:fld id="{3D3F9196-5FBD-45F8-86BD-A3D90AC79AC7}" type="datetimeFigureOut">
               <a:rPr lang="en-CA" smtClean="0"/>
               <a:pPr/>
-              <a:t>2024-02-12</a:t>
+              <a:t>2024-02-13</a:t>
             </a:fld>
             <a:endParaRPr lang="en-CA"/>
           </a:p>
@@ -3817,7 +3821,13 @@
   <p:cSld>
     <p:spTree>
       <p:nvGrpSpPr>
-        <p:cNvPr id="1" name=""/>
+        <p:cNvPr id="1" name="">
+          <a:extLst>
+            <a:ext uri="{FF2B5EF4-FFF2-40B4-BE49-F238E27FC236}">
+              <a16:creationId xmlns:a16="http://schemas.microsoft.com/office/drawing/2014/main" id="{96991DD0-9FA1-9893-AFBB-BAB64EE62B8E}"/>
+            </a:ext>
+          </a:extLst>
+        </p:cNvPr>
         <p:cNvGrpSpPr/>
         <p:nvPr/>
       </p:nvGrpSpPr>
@@ -3831,10 +3841,10 @@
       </p:grpSpPr>
       <p:sp>
         <p:nvSpPr>
-          <p:cNvPr id="2" name="Oval 1">
+          <p:cNvPr id="4" name="Oval 3">
             <a:extLst>
               <a:ext uri="{FF2B5EF4-FFF2-40B4-BE49-F238E27FC236}">
-                <a16:creationId xmlns:a16="http://schemas.microsoft.com/office/drawing/2014/main" id="{B8FBC568-FD2B-5F0F-0EB3-E5899A6AF2A0}"/>
+                <a16:creationId xmlns:a16="http://schemas.microsoft.com/office/drawing/2014/main" id="{68CF113F-242B-C85E-34AC-BB78CBCB23B1}"/>
               </a:ext>
             </a:extLst>
           </p:cNvPr>
@@ -3843,8 +3853,8 @@
         </p:nvSpPr>
         <p:spPr>
           <a:xfrm>
-            <a:off x="2286000" y="666750"/>
-            <a:ext cx="4191000" cy="4191000"/>
+            <a:off x="4343400" y="2724150"/>
+            <a:ext cx="76200" cy="76200"/>
           </a:xfrm>
           <a:prstGeom prst="ellipse">
             <a:avLst/>
@@ -3877,10 +3887,124 @@
       </p:sp>
       <p:sp>
         <p:nvSpPr>
-          <p:cNvPr id="3" name="Oval 2">
+          <p:cNvPr id="5" name="Title 4">
             <a:extLst>
               <a:ext uri="{FF2B5EF4-FFF2-40B4-BE49-F238E27FC236}">
-                <a16:creationId xmlns:a16="http://schemas.microsoft.com/office/drawing/2014/main" id="{8D903ED2-B181-90DE-A784-FB182A26E580}"/>
+                <a16:creationId xmlns:a16="http://schemas.microsoft.com/office/drawing/2014/main" id="{AAB84E68-BF0B-B7F3-9C92-552469D23532}"/>
+              </a:ext>
+            </a:extLst>
+          </p:cNvPr>
+          <p:cNvSpPr>
+            <a:spLocks noGrp="1"/>
+          </p:cNvSpPr>
+          <p:nvPr>
+            <p:ph type="title"/>
+          </p:nvPr>
+        </p:nvSpPr>
+        <p:spPr/>
+        <p:txBody>
+          <a:bodyPr/>
+          <a:lstStyle/>
+          <a:p>
+            <a:r>
+              <a:rPr lang="en-CA" dirty="0"/>
+              <a:t>Larger model LOD</a:t>
+            </a:r>
+          </a:p>
+        </p:txBody>
+      </p:sp>
+      <p:sp>
+        <p:nvSpPr>
+          <p:cNvPr id="6" name="Content Placeholder 5">
+            <a:extLst>
+              <a:ext uri="{FF2B5EF4-FFF2-40B4-BE49-F238E27FC236}">
+                <a16:creationId xmlns:a16="http://schemas.microsoft.com/office/drawing/2014/main" id="{A55FBAC5-19DD-6236-CC5A-3BBC0CA1D607}"/>
+              </a:ext>
+            </a:extLst>
+          </p:cNvPr>
+          <p:cNvSpPr>
+            <a:spLocks noGrp="1"/>
+          </p:cNvSpPr>
+          <p:nvPr>
+            <p:ph idx="1"/>
+          </p:nvPr>
+        </p:nvSpPr>
+        <p:spPr/>
+        <p:txBody>
+          <a:bodyPr>
+            <a:normAutofit fontScale="92500" lnSpcReduction="10000"/>
+          </a:bodyPr>
+          <a:lstStyle/>
+          <a:p>
+            <a:r>
+              <a:rPr lang="en-CA" dirty="0"/>
+              <a:t>What if you have a single large model, like Hogwarts or the Death Star? </a:t>
+            </a:r>
+          </a:p>
+          <a:p>
+            <a:r>
+              <a:rPr lang="en-CA" dirty="0"/>
+              <a:t>You could:</a:t>
+            </a:r>
+          </a:p>
+          <a:p>
+            <a:pPr lvl="1"/>
+            <a:r>
+              <a:rPr lang="en-CA" dirty="0"/>
+              <a:t>Divide the object into large parts and store various LODs of those parts</a:t>
+            </a:r>
+          </a:p>
+          <a:p>
+            <a:pPr lvl="1"/>
+            <a:r>
+              <a:rPr lang="en-CA" dirty="0"/>
+              <a:t>Store information of what parts you can see from what location – if you are in a room of Hogwarts, you can only see “these” other parts, for instance</a:t>
+            </a:r>
+          </a:p>
+        </p:txBody>
+      </p:sp>
+    </p:spTree>
+    <p:extLst>
+      <p:ext uri="{BB962C8B-B14F-4D97-AF65-F5344CB8AC3E}">
+        <p14:creationId xmlns:p14="http://schemas.microsoft.com/office/powerpoint/2010/main" val="1739239722"/>
+      </p:ext>
+    </p:extLst>
+  </p:cSld>
+  <p:clrMapOvr>
+    <a:masterClrMapping/>
+  </p:clrMapOvr>
+</p:sld>
+</file>
+
+<file path=ppt/slides/slide3.xml><?xml version="1.0" encoding="utf-8"?>
+<p:sld xmlns:a="http://schemas.openxmlformats.org/drawingml/2006/main" xmlns:r="http://schemas.openxmlformats.org/officeDocument/2006/relationships" xmlns:p="http://schemas.openxmlformats.org/presentationml/2006/main">
+  <p:cSld>
+    <p:spTree>
+      <p:nvGrpSpPr>
+        <p:cNvPr id="1" name="">
+          <a:extLst>
+            <a:ext uri="{FF2B5EF4-FFF2-40B4-BE49-F238E27FC236}">
+              <a16:creationId xmlns:a16="http://schemas.microsoft.com/office/drawing/2014/main" id="{E26AF87E-FAA2-8A57-C4D0-5F17C60CC39F}"/>
+            </a:ext>
+          </a:extLst>
+        </p:cNvPr>
+        <p:cNvGrpSpPr/>
+        <p:nvPr/>
+      </p:nvGrpSpPr>
+      <p:grpSpPr>
+        <a:xfrm>
+          <a:off x="0" y="0"/>
+          <a:ext cx="0" cy="0"/>
+          <a:chOff x="0" y="0"/>
+          <a:chExt cx="0" cy="0"/>
+        </a:xfrm>
+      </p:grpSpPr>
+      <p:sp>
+        <p:nvSpPr>
+          <p:cNvPr id="4" name="Oval 3">
+            <a:extLst>
+              <a:ext uri="{FF2B5EF4-FFF2-40B4-BE49-F238E27FC236}">
+                <a16:creationId xmlns:a16="http://schemas.microsoft.com/office/drawing/2014/main" id="{353C9FE6-AF9B-7A1D-E2CB-743FDA5642A3}"/>
               </a:ext>
             </a:extLst>
           </p:cNvPr>
@@ -3889,8 +4013,8 @@
         </p:nvSpPr>
         <p:spPr>
           <a:xfrm>
-            <a:off x="3467100" y="1847850"/>
-            <a:ext cx="1828800" cy="1828800"/>
+            <a:off x="4343400" y="2724150"/>
+            <a:ext cx="76200" cy="76200"/>
           </a:xfrm>
           <a:prstGeom prst="ellipse">
             <a:avLst/>
@@ -3923,10 +4047,125 @@
       </p:sp>
       <p:sp>
         <p:nvSpPr>
+          <p:cNvPr id="5" name="Title 4">
+            <a:extLst>
+              <a:ext uri="{FF2B5EF4-FFF2-40B4-BE49-F238E27FC236}">
+                <a16:creationId xmlns:a16="http://schemas.microsoft.com/office/drawing/2014/main" id="{BB03302F-D5C5-5C83-346C-696D0C934D17}"/>
+              </a:ext>
+            </a:extLst>
+          </p:cNvPr>
+          <p:cNvSpPr>
+            <a:spLocks noGrp="1"/>
+          </p:cNvSpPr>
+          <p:nvPr>
+            <p:ph type="title"/>
+          </p:nvPr>
+        </p:nvSpPr>
+        <p:spPr/>
+        <p:txBody>
+          <a:bodyPr>
+            <a:normAutofit fontScale="90000"/>
+          </a:bodyPr>
+          <a:lstStyle/>
+          <a:p>
+            <a:r>
+              <a:rPr lang="en-CA" dirty="0"/>
+              <a:t>Terrain and other continuous things </a:t>
+            </a:r>
+          </a:p>
+        </p:txBody>
+      </p:sp>
+      <p:sp>
+        <p:nvSpPr>
+          <p:cNvPr id="6" name="Content Placeholder 5">
+            <a:extLst>
+              <a:ext uri="{FF2B5EF4-FFF2-40B4-BE49-F238E27FC236}">
+                <a16:creationId xmlns:a16="http://schemas.microsoft.com/office/drawing/2014/main" id="{4344BF1D-07AD-0A13-F407-6E8EBE8F4536}"/>
+              </a:ext>
+            </a:extLst>
+          </p:cNvPr>
+          <p:cNvSpPr>
+            <a:spLocks noGrp="1"/>
+          </p:cNvSpPr>
+          <p:nvPr>
+            <p:ph idx="1"/>
+          </p:nvPr>
+        </p:nvSpPr>
+        <p:spPr>
+          <a:xfrm>
+            <a:off x="609600" y="1559994"/>
+            <a:ext cx="8229600" cy="3469207"/>
+          </a:xfrm>
+        </p:spPr>
+        <p:txBody>
+          <a:bodyPr/>
+          <a:lstStyle/>
+          <a:p>
+            <a:r>
+              <a:rPr lang="en-CA" dirty="0"/>
+              <a:t>We are often very near the surface</a:t>
+            </a:r>
+          </a:p>
+          <a:p>
+            <a:pPr lvl="1"/>
+            <a:r>
+              <a:rPr lang="en-CA" dirty="0"/>
+              <a:t>Do very distant terrain mesh isn’t visible at that distance. </a:t>
+            </a:r>
+          </a:p>
+          <a:p>
+            <a:r>
+              <a:rPr lang="en-CA" dirty="0"/>
+              <a:t>BUT the mesh nearest to us IS at high res. </a:t>
+            </a:r>
+          </a:p>
+          <a:p>
+            <a:endParaRPr lang="en-CA" dirty="0"/>
+          </a:p>
+        </p:txBody>
+      </p:sp>
+    </p:spTree>
+    <p:extLst>
+      <p:ext uri="{BB962C8B-B14F-4D97-AF65-F5344CB8AC3E}">
+        <p14:creationId xmlns:p14="http://schemas.microsoft.com/office/powerpoint/2010/main" val="992459457"/>
+      </p:ext>
+    </p:extLst>
+  </p:cSld>
+  <p:clrMapOvr>
+    <a:masterClrMapping/>
+  </p:clrMapOvr>
+</p:sld>
+</file>
+
+<file path=ppt/slides/slide4.xml><?xml version="1.0" encoding="utf-8"?>
+<p:sld xmlns:a="http://schemas.openxmlformats.org/drawingml/2006/main" xmlns:r="http://schemas.openxmlformats.org/officeDocument/2006/relationships" xmlns:p="http://schemas.openxmlformats.org/presentationml/2006/main">
+  <p:cSld>
+    <p:spTree>
+      <p:nvGrpSpPr>
+        <p:cNvPr id="1" name="">
+          <a:extLst>
+            <a:ext uri="{FF2B5EF4-FFF2-40B4-BE49-F238E27FC236}">
+              <a16:creationId xmlns:a16="http://schemas.microsoft.com/office/drawing/2014/main" id="{8ABDAA90-ECDD-AB1E-5898-9A2DE2EEB0F1}"/>
+            </a:ext>
+          </a:extLst>
+        </p:cNvPr>
+        <p:cNvGrpSpPr/>
+        <p:nvPr/>
+      </p:nvGrpSpPr>
+      <p:grpSpPr>
+        <a:xfrm>
+          <a:off x="0" y="0"/>
+          <a:ext cx="0" cy="0"/>
+          <a:chOff x="0" y="0"/>
+          <a:chExt cx="0" cy="0"/>
+        </a:xfrm>
+      </p:grpSpPr>
+      <p:sp>
+        <p:nvSpPr>
           <p:cNvPr id="4" name="Oval 3">
             <a:extLst>
               <a:ext uri="{FF2B5EF4-FFF2-40B4-BE49-F238E27FC236}">
-                <a16:creationId xmlns:a16="http://schemas.microsoft.com/office/drawing/2014/main" id="{0EE8B96B-5593-432D-AADA-89B3E3257160}"/>
+                <a16:creationId xmlns:a16="http://schemas.microsoft.com/office/drawing/2014/main" id="{CBDBF047-65F1-CBB1-5952-E780FB907402}"/>
               </a:ext>
             </a:extLst>
           </p:cNvPr>
@@ -3967,10 +4206,449 @@
           </a:p>
         </p:txBody>
       </p:sp>
+      <p:sp>
+        <p:nvSpPr>
+          <p:cNvPr id="5" name="Title 4">
+            <a:extLst>
+              <a:ext uri="{FF2B5EF4-FFF2-40B4-BE49-F238E27FC236}">
+                <a16:creationId xmlns:a16="http://schemas.microsoft.com/office/drawing/2014/main" id="{184583ED-E542-705F-C253-2CF5BE6D275E}"/>
+              </a:ext>
+            </a:extLst>
+          </p:cNvPr>
+          <p:cNvSpPr>
+            <a:spLocks noGrp="1"/>
+          </p:cNvSpPr>
+          <p:nvPr>
+            <p:ph type="title"/>
+          </p:nvPr>
+        </p:nvSpPr>
+        <p:spPr/>
+        <p:txBody>
+          <a:bodyPr>
+            <a:normAutofit fontScale="90000"/>
+          </a:bodyPr>
+          <a:lstStyle/>
+          <a:p>
+            <a:r>
+              <a:rPr lang="en-CA" dirty="0"/>
+              <a:t>Terrain and other continuous things </a:t>
+            </a:r>
+          </a:p>
+        </p:txBody>
+      </p:sp>
+      <p:sp>
+        <p:nvSpPr>
+          <p:cNvPr id="6" name="Content Placeholder 5">
+            <a:extLst>
+              <a:ext uri="{FF2B5EF4-FFF2-40B4-BE49-F238E27FC236}">
+                <a16:creationId xmlns:a16="http://schemas.microsoft.com/office/drawing/2014/main" id="{782D953D-A5E5-306E-9CDE-4176E6876A8D}"/>
+              </a:ext>
+            </a:extLst>
+          </p:cNvPr>
+          <p:cNvSpPr>
+            <a:spLocks noGrp="1"/>
+          </p:cNvSpPr>
+          <p:nvPr>
+            <p:ph idx="1"/>
+          </p:nvPr>
+        </p:nvSpPr>
+        <p:spPr>
+          <a:xfrm>
+            <a:off x="609600" y="1559994"/>
+            <a:ext cx="8229600" cy="3469207"/>
+          </a:xfrm>
+        </p:spPr>
+        <p:txBody>
+          <a:bodyPr/>
+          <a:lstStyle/>
+          <a:p>
+            <a:r>
+              <a:rPr lang="en-CA" dirty="0"/>
+              <a:t>Geo </a:t>
+            </a:r>
+            <a:r>
+              <a:rPr lang="en-CA" dirty="0" err="1"/>
+              <a:t>MipMapping</a:t>
+            </a:r>
+            <a:r>
+              <a:rPr lang="en-CA" dirty="0"/>
+              <a:t> and variations</a:t>
+            </a:r>
+          </a:p>
+          <a:p>
+            <a:pPr lvl="1"/>
+            <a:r>
+              <a:rPr lang="en-CA" dirty="0">
+                <a:hlinkClick r:id="rId2"/>
+              </a:rPr>
+              <a:t>https://gengamedev.blogspot.com/2009/03/real-time-terrain-with-geo-mipmapping.html</a:t>
+            </a:r>
+            <a:endParaRPr lang="en-CA" dirty="0"/>
+          </a:p>
+          <a:p>
+            <a:pPr lvl="1"/>
+            <a:endParaRPr lang="en-CA" dirty="0"/>
+          </a:p>
+        </p:txBody>
+      </p:sp>
+      <p:pic>
+        <p:nvPicPr>
+          <p:cNvPr id="1026" name="Picture 2" descr="TerraMonkey - The jMonkeyEngine Terrain System :: jMonkeyEngine Docs">
+            <a:extLst>
+              <a:ext uri="{FF2B5EF4-FFF2-40B4-BE49-F238E27FC236}">
+                <a16:creationId xmlns:a16="http://schemas.microsoft.com/office/drawing/2014/main" id="{9C751E30-A9A0-A52B-711B-86E7CDCD3223}"/>
+              </a:ext>
+            </a:extLst>
+          </p:cNvPr>
+          <p:cNvPicPr>
+            <a:picLocks noChangeAspect="1" noChangeArrowheads="1"/>
+          </p:cNvPicPr>
+          <p:nvPr/>
+        </p:nvPicPr>
+        <p:blipFill>
+          <a:blip r:embed="rId3">
+            <a:extLst>
+              <a:ext uri="{28A0092B-C50C-407E-A947-70E740481C1C}">
+                <a14:useLocalDpi xmlns:a14="http://schemas.microsoft.com/office/drawing/2010/main" val="0"/>
+              </a:ext>
+            </a:extLst>
+          </a:blip>
+          <a:srcRect/>
+          <a:stretch>
+            <a:fillRect/>
+          </a:stretch>
+        </p:blipFill>
+        <p:spPr bwMode="auto">
+          <a:xfrm>
+            <a:off x="5867400" y="2952750"/>
+            <a:ext cx="2819400" cy="1927324"/>
+          </a:xfrm>
+          <a:prstGeom prst="rect">
+            <a:avLst/>
+          </a:prstGeom>
+          <a:noFill/>
+          <a:extLst>
+            <a:ext uri="{909E8E84-426E-40DD-AFC4-6F175D3DCCD1}">
+              <a14:hiddenFill xmlns:a14="http://schemas.microsoft.com/office/drawing/2010/main">
+                <a:solidFill>
+                  <a:srgbClr val="FFFFFF"/>
+                </a:solidFill>
+              </a14:hiddenFill>
+            </a:ext>
+          </a:extLst>
+        </p:spPr>
+      </p:pic>
+    </p:spTree>
+    <p:extLst>
+      <p:ext uri="{BB962C8B-B14F-4D97-AF65-F5344CB8AC3E}">
+        <p14:creationId xmlns:p14="http://schemas.microsoft.com/office/powerpoint/2010/main" val="4134178106"/>
+      </p:ext>
+    </p:extLst>
+  </p:cSld>
+  <p:clrMapOvr>
+    <a:masterClrMapping/>
+  </p:clrMapOvr>
+</p:sld>
+</file>
+
+<file path=ppt/slides/slide5.xml><?xml version="1.0" encoding="utf-8"?>
+<p:sld xmlns:a="http://schemas.openxmlformats.org/drawingml/2006/main" xmlns:r="http://schemas.openxmlformats.org/officeDocument/2006/relationships" xmlns:p="http://schemas.openxmlformats.org/presentationml/2006/main">
+  <p:cSld>
+    <p:spTree>
+      <p:nvGrpSpPr>
+        <p:cNvPr id="1" name=""/>
+        <p:cNvGrpSpPr/>
+        <p:nvPr/>
+      </p:nvGrpSpPr>
+      <p:grpSpPr>
+        <a:xfrm>
+          <a:off x="0" y="0"/>
+          <a:ext cx="0" cy="0"/>
+          <a:chOff x="0" y="0"/>
+          <a:chExt cx="0" cy="0"/>
+        </a:xfrm>
+      </p:grpSpPr>
+      <p:sp>
+        <p:nvSpPr>
+          <p:cNvPr id="4" name="Oval 3">
+            <a:extLst>
+              <a:ext uri="{FF2B5EF4-FFF2-40B4-BE49-F238E27FC236}">
+                <a16:creationId xmlns:a16="http://schemas.microsoft.com/office/drawing/2014/main" id="{0EE8B96B-5593-432D-AADA-89B3E3257160}"/>
+              </a:ext>
+            </a:extLst>
+          </p:cNvPr>
+          <p:cNvSpPr/>
+          <p:nvPr/>
+        </p:nvSpPr>
+        <p:spPr>
+          <a:xfrm>
+            <a:off x="4343400" y="2724150"/>
+            <a:ext cx="76200" cy="76200"/>
+          </a:xfrm>
+          <a:prstGeom prst="ellipse">
+            <a:avLst/>
+          </a:prstGeom>
+        </p:spPr>
+        <p:style>
+          <a:lnRef idx="2">
+            <a:schemeClr val="accent1">
+              <a:shade val="15000"/>
+            </a:schemeClr>
+          </a:lnRef>
+          <a:fillRef idx="1">
+            <a:schemeClr val="accent1"/>
+          </a:fillRef>
+          <a:effectRef idx="0">
+            <a:schemeClr val="accent1"/>
+          </a:effectRef>
+          <a:fontRef idx="minor">
+            <a:schemeClr val="lt1"/>
+          </a:fontRef>
+        </p:style>
+        <p:txBody>
+          <a:bodyPr rtlCol="0" anchor="ctr"/>
+          <a:lstStyle/>
+          <a:p>
+            <a:pPr algn="ctr"/>
+            <a:endParaRPr lang="en-CA"/>
+          </a:p>
+        </p:txBody>
+      </p:sp>
+      <p:sp>
+        <p:nvSpPr>
+          <p:cNvPr id="5" name="Title 4">
+            <a:extLst>
+              <a:ext uri="{FF2B5EF4-FFF2-40B4-BE49-F238E27FC236}">
+                <a16:creationId xmlns:a16="http://schemas.microsoft.com/office/drawing/2014/main" id="{DB60B089-97D8-44A9-C06E-D97D40790AD3}"/>
+              </a:ext>
+            </a:extLst>
+          </p:cNvPr>
+          <p:cNvSpPr>
+            <a:spLocks noGrp="1"/>
+          </p:cNvSpPr>
+          <p:nvPr>
+            <p:ph type="title"/>
+          </p:nvPr>
+        </p:nvSpPr>
+        <p:spPr/>
+        <p:txBody>
+          <a:bodyPr>
+            <a:normAutofit fontScale="90000"/>
+          </a:bodyPr>
+          <a:lstStyle/>
+          <a:p>
+            <a:r>
+              <a:rPr lang="en-CA" dirty="0"/>
+              <a:t>Terrain and other continuous things </a:t>
+            </a:r>
+          </a:p>
+        </p:txBody>
+      </p:sp>
+      <p:sp>
+        <p:nvSpPr>
+          <p:cNvPr id="6" name="Content Placeholder 5">
+            <a:extLst>
+              <a:ext uri="{FF2B5EF4-FFF2-40B4-BE49-F238E27FC236}">
+                <a16:creationId xmlns:a16="http://schemas.microsoft.com/office/drawing/2014/main" id="{17F95933-8BE1-3D04-3823-CC570D0D5917}"/>
+              </a:ext>
+            </a:extLst>
+          </p:cNvPr>
+          <p:cNvSpPr>
+            <a:spLocks noGrp="1"/>
+          </p:cNvSpPr>
+          <p:nvPr>
+            <p:ph idx="1"/>
+          </p:nvPr>
+        </p:nvSpPr>
+        <p:spPr/>
+        <p:txBody>
+          <a:bodyPr/>
+          <a:lstStyle/>
+          <a:p>
+            <a:r>
+              <a:rPr lang="en-CA" dirty="0"/>
+              <a:t>ROAM:</a:t>
+            </a:r>
+          </a:p>
+          <a:p>
+            <a:r>
+              <a:rPr lang="en-CA" dirty="0">
+                <a:hlinkClick r:id="rId2"/>
+              </a:rPr>
+              <a:t>https://en.wikipedia.org/wiki/ROAM</a:t>
+            </a:r>
+            <a:endParaRPr lang="en-CA" dirty="0"/>
+          </a:p>
+          <a:p>
+            <a:r>
+              <a:rPr lang="en-CA" dirty="0">
+                <a:hlinkClick r:id="rId3"/>
+              </a:rPr>
+              <a:t>https://www.osti.gov/servlets/purl/632827</a:t>
+            </a:r>
+            <a:r>
+              <a:rPr lang="en-CA" dirty="0"/>
+              <a:t> </a:t>
+            </a:r>
+          </a:p>
+        </p:txBody>
+      </p:sp>
     </p:spTree>
     <p:extLst>
       <p:ext uri="{BB962C8B-B14F-4D97-AF65-F5344CB8AC3E}">
         <p14:creationId xmlns:p14="http://schemas.microsoft.com/office/powerpoint/2010/main" val="2002090877"/>
+      </p:ext>
+    </p:extLst>
+  </p:cSld>
+  <p:clrMapOvr>
+    <a:masterClrMapping/>
+  </p:clrMapOvr>
+</p:sld>
+</file>
+
+<file path=ppt/slides/slide6.xml><?xml version="1.0" encoding="utf-8"?>
+<p:sld xmlns:a="http://schemas.openxmlformats.org/drawingml/2006/main" xmlns:r="http://schemas.openxmlformats.org/officeDocument/2006/relationships" xmlns:p="http://schemas.openxmlformats.org/presentationml/2006/main">
+  <p:cSld>
+    <p:spTree>
+      <p:nvGrpSpPr>
+        <p:cNvPr id="1" name="">
+          <a:extLst>
+            <a:ext uri="{FF2B5EF4-FFF2-40B4-BE49-F238E27FC236}">
+              <a16:creationId xmlns:a16="http://schemas.microsoft.com/office/drawing/2014/main" id="{29DBA44C-E2DE-4FD4-628C-741B8C29F3DE}"/>
+            </a:ext>
+          </a:extLst>
+        </p:cNvPr>
+        <p:cNvGrpSpPr/>
+        <p:nvPr/>
+      </p:nvGrpSpPr>
+      <p:grpSpPr>
+        <a:xfrm>
+          <a:off x="0" y="0"/>
+          <a:ext cx="0" cy="0"/>
+          <a:chOff x="0" y="0"/>
+          <a:chExt cx="0" cy="0"/>
+        </a:xfrm>
+      </p:grpSpPr>
+      <p:sp>
+        <p:nvSpPr>
+          <p:cNvPr id="4" name="Oval 3">
+            <a:extLst>
+              <a:ext uri="{FF2B5EF4-FFF2-40B4-BE49-F238E27FC236}">
+                <a16:creationId xmlns:a16="http://schemas.microsoft.com/office/drawing/2014/main" id="{0740217E-3F2B-E2C0-A794-67438872485A}"/>
+              </a:ext>
+            </a:extLst>
+          </p:cNvPr>
+          <p:cNvSpPr/>
+          <p:nvPr/>
+        </p:nvSpPr>
+        <p:spPr>
+          <a:xfrm>
+            <a:off x="4343400" y="2724150"/>
+            <a:ext cx="76200" cy="76200"/>
+          </a:xfrm>
+          <a:prstGeom prst="ellipse">
+            <a:avLst/>
+          </a:prstGeom>
+        </p:spPr>
+        <p:style>
+          <a:lnRef idx="2">
+            <a:schemeClr val="accent1">
+              <a:shade val="15000"/>
+            </a:schemeClr>
+          </a:lnRef>
+          <a:fillRef idx="1">
+            <a:schemeClr val="accent1"/>
+          </a:fillRef>
+          <a:effectRef idx="0">
+            <a:schemeClr val="accent1"/>
+          </a:effectRef>
+          <a:fontRef idx="minor">
+            <a:schemeClr val="lt1"/>
+          </a:fontRef>
+        </p:style>
+        <p:txBody>
+          <a:bodyPr rtlCol="0" anchor="ctr"/>
+          <a:lstStyle/>
+          <a:p>
+            <a:pPr algn="ctr"/>
+            <a:endParaRPr lang="en-CA"/>
+          </a:p>
+        </p:txBody>
+      </p:sp>
+      <p:sp>
+        <p:nvSpPr>
+          <p:cNvPr id="5" name="Title 4">
+            <a:extLst>
+              <a:ext uri="{FF2B5EF4-FFF2-40B4-BE49-F238E27FC236}">
+                <a16:creationId xmlns:a16="http://schemas.microsoft.com/office/drawing/2014/main" id="{D04D05CD-78ED-9855-633E-629FC9666A9C}"/>
+              </a:ext>
+            </a:extLst>
+          </p:cNvPr>
+          <p:cNvSpPr>
+            <a:spLocks noGrp="1"/>
+          </p:cNvSpPr>
+          <p:nvPr>
+            <p:ph type="title"/>
+          </p:nvPr>
+        </p:nvSpPr>
+        <p:spPr/>
+        <p:txBody>
+          <a:bodyPr>
+            <a:normAutofit/>
+          </a:bodyPr>
+          <a:lstStyle/>
+          <a:p>
+            <a:r>
+              <a:rPr lang="en-CA" dirty="0"/>
+              <a:t>L-Systems</a:t>
+            </a:r>
+          </a:p>
+        </p:txBody>
+      </p:sp>
+      <p:sp>
+        <p:nvSpPr>
+          <p:cNvPr id="6" name="Content Placeholder 5">
+            <a:extLst>
+              <a:ext uri="{FF2B5EF4-FFF2-40B4-BE49-F238E27FC236}">
+                <a16:creationId xmlns:a16="http://schemas.microsoft.com/office/drawing/2014/main" id="{F80D714F-6864-F6C0-1F1B-7DEAAB8C14DC}"/>
+              </a:ext>
+            </a:extLst>
+          </p:cNvPr>
+          <p:cNvSpPr>
+            <a:spLocks noGrp="1"/>
+          </p:cNvSpPr>
+          <p:nvPr>
+            <p:ph idx="1"/>
+          </p:nvPr>
+        </p:nvSpPr>
+        <p:spPr/>
+        <p:txBody>
+          <a:bodyPr/>
+          <a:lstStyle/>
+          <a:p>
+            <a:r>
+              <a:rPr lang="en-CA" dirty="0"/>
+              <a:t>It’s also a form of compression where you store the information in some “short-hand”</a:t>
+            </a:r>
+          </a:p>
+          <a:p>
+            <a:r>
+              <a:rPr lang="en-CA">
+                <a:hlinkClick r:id="rId2"/>
+              </a:rPr>
+              <a:t>https://en.wikipedia.org/wiki/L-system</a:t>
+            </a:r>
+            <a:endParaRPr lang="en-CA"/>
+          </a:p>
+          <a:p>
+            <a:endParaRPr lang="en-CA" dirty="0"/>
+          </a:p>
+        </p:txBody>
+      </p:sp>
+    </p:spTree>
+    <p:extLst>
+      <p:ext uri="{BB962C8B-B14F-4D97-AF65-F5344CB8AC3E}">
+        <p14:creationId xmlns:p14="http://schemas.microsoft.com/office/powerpoint/2010/main" val="1633386965"/>
       </p:ext>
     </p:extLst>
   </p:cSld>

</xml_diff>